<commit_message>
repair pfd file load
</commit_message>
<xml_diff>
--- a/JOB RECOMMENDER.pptx
+++ b/JOB RECOMMENDER.pptx
@@ -3370,7 +3370,7 @@
         </p:nvSpPr>
         <p:spPr>
           <a:xfrm>
-            <a:off x="479394" y="284084"/>
+            <a:off x="239697" y="1899820"/>
             <a:ext cx="11398927" cy="2281562"/>
           </a:xfrm>
         </p:spPr>
@@ -3414,36 +3414,6 @@
                 <a:schemeClr val="accent1"/>
               </a:solidFill>
             </a:endParaRPr>
-          </a:p>
-        </p:txBody>
-      </p:sp>
-      <p:sp>
-        <p:nvSpPr>
-          <p:cNvPr id="3" name="Subtitle 2">
-            <a:extLst>
-              <a:ext uri="{FF2B5EF4-FFF2-40B4-BE49-F238E27FC236}">
-                <a16:creationId xmlns:a16="http://schemas.microsoft.com/office/drawing/2014/main" id="{86FA07F6-FA34-47C6-BFB1-94111673A9FA}"/>
-              </a:ext>
-            </a:extLst>
-          </p:cNvPr>
-          <p:cNvSpPr>
-            <a:spLocks noGrp="1"/>
-          </p:cNvSpPr>
-          <p:nvPr>
-            <p:ph type="subTitle" idx="1"/>
-          </p:nvPr>
-        </p:nvSpPr>
-        <p:spPr>
-          <a:xfrm>
-            <a:off x="1168892" y="2787588"/>
-            <a:ext cx="10398711" cy="3411245"/>
-          </a:xfrm>
-        </p:spPr>
-        <p:txBody>
-          <a:bodyPr/>
-          <a:lstStyle/>
-          <a:p>
-            <a:endParaRPr lang="de-DE" dirty="0"/>
           </a:p>
         </p:txBody>
       </p:sp>
@@ -3533,8 +3503,8 @@
         </p:nvSpPr>
         <p:spPr>
           <a:xfrm>
-            <a:off x="802688" y="1582341"/>
-            <a:ext cx="6507332" cy="1846659"/>
+            <a:off x="210260" y="1845012"/>
+            <a:ext cx="6507332" cy="1107996"/>
           </a:xfrm>
           <a:prstGeom prst="rect">
             <a:avLst/>
@@ -3552,22 +3522,6 @@
                 <a:latin typeface="Times New Roman" panose="02020603050405020304" pitchFamily="18" charset="0"/>
                 <a:cs typeface="Times New Roman" panose="02020603050405020304" pitchFamily="18" charset="0"/>
               </a:rPr>
-              <a:t>Time	     : </a:t>
-            </a:r>
-            <a:r>
-              <a:rPr lang="de-DE" sz="2400" dirty="0">
-                <a:latin typeface="Times New Roman" panose="02020603050405020304" pitchFamily="18" charset="0"/>
-                <a:cs typeface="Times New Roman" panose="02020603050405020304" pitchFamily="18" charset="0"/>
-              </a:rPr>
-              <a:t>21.07 and 29.07</a:t>
-            </a:r>
-          </a:p>
-          <a:p>
-            <a:r>
-              <a:rPr lang="de-DE" sz="2400" b="1" dirty="0">
-                <a:latin typeface="Times New Roman" panose="02020603050405020304" pitchFamily="18" charset="0"/>
-                <a:cs typeface="Times New Roman" panose="02020603050405020304" pitchFamily="18" charset="0"/>
-              </a:rPr>
               <a:t>Keyword : </a:t>
             </a:r>
             <a:r>
@@ -3607,54 +3561,6 @@
               </a:rPr>
               <a:t> Germany</a:t>
             </a:r>
-          </a:p>
-          <a:p>
-            <a:r>
-              <a:rPr lang="de-DE" sz="2400" b="1" dirty="0" err="1">
-                <a:latin typeface="Times New Roman" panose="02020603050405020304" pitchFamily="18" charset="0"/>
-                <a:cs typeface="Times New Roman" panose="02020603050405020304" pitchFamily="18" charset="0"/>
-              </a:rPr>
-              <a:t>Platform</a:t>
-            </a:r>
-            <a:r>
-              <a:rPr lang="de-DE" sz="2400" b="1" dirty="0">
-                <a:latin typeface="Times New Roman" panose="02020603050405020304" pitchFamily="18" charset="0"/>
-                <a:cs typeface="Times New Roman" panose="02020603050405020304" pitchFamily="18" charset="0"/>
-              </a:rPr>
-              <a:t>  :</a:t>
-            </a:r>
-            <a:r>
-              <a:rPr lang="de-DE" sz="2400" dirty="0">
-                <a:latin typeface="Times New Roman" panose="02020603050405020304" pitchFamily="18" charset="0"/>
-                <a:cs typeface="Times New Roman" panose="02020603050405020304" pitchFamily="18" charset="0"/>
-              </a:rPr>
-              <a:t> </a:t>
-            </a:r>
-            <a:r>
-              <a:rPr lang="de-DE" sz="2400" dirty="0" err="1">
-                <a:latin typeface="Times New Roman" panose="02020603050405020304" pitchFamily="18" charset="0"/>
-                <a:cs typeface="Times New Roman" panose="02020603050405020304" pitchFamily="18" charset="0"/>
-              </a:rPr>
-              <a:t>Indeed</a:t>
-            </a:r>
-            <a:r>
-              <a:rPr lang="de-DE" sz="2400" dirty="0">
-                <a:latin typeface="Times New Roman" panose="02020603050405020304" pitchFamily="18" charset="0"/>
-                <a:cs typeface="Times New Roman" panose="02020603050405020304" pitchFamily="18" charset="0"/>
-              </a:rPr>
-              <a:t>, Glassdoor and </a:t>
-            </a:r>
-            <a:r>
-              <a:rPr lang="de-DE" sz="2400" dirty="0" err="1">
-                <a:latin typeface="Times New Roman" panose="02020603050405020304" pitchFamily="18" charset="0"/>
-                <a:cs typeface="Times New Roman" panose="02020603050405020304" pitchFamily="18" charset="0"/>
-              </a:rPr>
-              <a:t>Linkedin</a:t>
-            </a:r>
-            <a:endParaRPr lang="de-DE" sz="2400" dirty="0">
-              <a:latin typeface="Times New Roman" panose="02020603050405020304" pitchFamily="18" charset="0"/>
-              <a:cs typeface="Times New Roman" panose="02020603050405020304" pitchFamily="18" charset="0"/>
-            </a:endParaRPr>
           </a:p>
           <a:p>
             <a:endParaRPr lang="de-DE" dirty="0"/>
@@ -3683,7 +3589,7 @@
         </p:blipFill>
         <p:spPr>
           <a:xfrm>
-            <a:off x="1094449" y="5275659"/>
+            <a:off x="437627" y="4026409"/>
             <a:ext cx="2924175" cy="876300"/>
           </a:xfrm>
           <a:prstGeom prst="rect">
@@ -3713,7 +3619,7 @@
         </p:blipFill>
         <p:spPr>
           <a:xfrm>
-            <a:off x="8626184" y="5342334"/>
+            <a:off x="8574668" y="4093084"/>
             <a:ext cx="3228975" cy="742950"/>
           </a:xfrm>
           <a:prstGeom prst="rect">
@@ -3721,53 +3627,6 @@
           </a:prstGeom>
         </p:spPr>
       </p:pic>
-      <p:sp>
-        <p:nvSpPr>
-          <p:cNvPr id="15" name="Rectangle 14">
-            <a:extLst>
-              <a:ext uri="{FF2B5EF4-FFF2-40B4-BE49-F238E27FC236}">
-                <a16:creationId xmlns:a16="http://schemas.microsoft.com/office/drawing/2014/main" id="{CB1CB52C-0CD7-4873-99A8-78E9C6F6AC31}"/>
-              </a:ext>
-            </a:extLst>
-          </p:cNvPr>
-          <p:cNvSpPr/>
-          <p:nvPr/>
-        </p:nvSpPr>
-        <p:spPr>
-          <a:xfrm>
-            <a:off x="4839809" y="4215328"/>
-            <a:ext cx="2512381" cy="550415"/>
-          </a:xfrm>
-          <a:prstGeom prst="rect">
-            <a:avLst/>
-          </a:prstGeom>
-        </p:spPr>
-        <p:style>
-          <a:lnRef idx="2">
-            <a:schemeClr val="accent6"/>
-          </a:lnRef>
-          <a:fillRef idx="1">
-            <a:schemeClr val="lt1"/>
-          </a:fillRef>
-          <a:effectRef idx="0">
-            <a:schemeClr val="accent6"/>
-          </a:effectRef>
-          <a:fontRef idx="minor">
-            <a:schemeClr val="dk1"/>
-          </a:fontRef>
-        </p:style>
-        <p:txBody>
-          <a:bodyPr rtlCol="0" anchor="ctr"/>
-          <a:lstStyle/>
-          <a:p>
-            <a:pPr algn="ctr"/>
-            <a:r>
-              <a:rPr lang="de-DE" sz="2800" b="1" dirty="0"/>
-              <a:t>3500</a:t>
-            </a:r>
-          </a:p>
-        </p:txBody>
-      </p:sp>
       <p:pic>
         <p:nvPicPr>
           <p:cNvPr id="37" name="Picture 36">
@@ -3820,7 +3679,7 @@
         </p:blipFill>
         <p:spPr>
           <a:xfrm>
-            <a:off x="4767879" y="5342334"/>
+            <a:off x="4347477" y="5683625"/>
             <a:ext cx="2943225" cy="676275"/>
           </a:xfrm>
           <a:prstGeom prst="rect">
@@ -3968,7 +3827,7 @@
           <a:p>
             <a:r>
               <a:rPr lang="de-DE" sz="2400" dirty="0"/>
-              <a:t>	English:  1465</a:t>
+              <a:t>	English:  ~ 1400</a:t>
             </a:r>
           </a:p>
           <a:p>
@@ -3982,7 +3841,7 @@
             </a:r>
             <a:r>
               <a:rPr lang="de-DE" sz="2400" dirty="0"/>
-              <a:t>: 2047</a:t>
+              <a:t>: ~ 2000</a:t>
             </a:r>
           </a:p>
         </p:txBody>
@@ -4557,7 +4416,7 @@
         <p:spPr>
           <a:xfrm>
             <a:off x="497151" y="1597981"/>
-            <a:ext cx="5992426" cy="461665"/>
+            <a:ext cx="7696938" cy="461665"/>
           </a:xfrm>
           <a:prstGeom prst="rect">
             <a:avLst/>
@@ -4571,60 +4430,67 @@
           <a:lstStyle/>
           <a:p>
             <a:r>
-              <a:rPr lang="de-DE" sz="2400" dirty="0" err="1">
+              <a:rPr lang="de-DE" sz="2400" b="1" dirty="0" err="1">
                 <a:latin typeface="Times New Roman" panose="02020603050405020304" pitchFamily="18" charset="0"/>
                 <a:cs typeface="Times New Roman" panose="02020603050405020304" pitchFamily="18" charset="0"/>
               </a:rPr>
               <a:t>Using</a:t>
             </a:r>
             <a:r>
+              <a:rPr lang="de-DE" sz="2400" b="1" dirty="0">
+                <a:latin typeface="Times New Roman" panose="02020603050405020304" pitchFamily="18" charset="0"/>
+                <a:cs typeface="Times New Roman" panose="02020603050405020304" pitchFamily="18" charset="0"/>
+              </a:rPr>
+              <a:t> </a:t>
+            </a:r>
+            <a:r>
+              <a:rPr lang="de-DE" sz="2400" b="1" dirty="0" err="1">
+                <a:latin typeface="Times New Roman" panose="02020603050405020304" pitchFamily="18" charset="0"/>
+                <a:cs typeface="Times New Roman" panose="02020603050405020304" pitchFamily="18" charset="0"/>
+              </a:rPr>
+              <a:t>natural</a:t>
+            </a:r>
+            <a:r>
+              <a:rPr lang="de-DE" sz="2400" b="1" dirty="0">
+                <a:latin typeface="Times New Roman" panose="02020603050405020304" pitchFamily="18" charset="0"/>
+                <a:cs typeface="Times New Roman" panose="02020603050405020304" pitchFamily="18" charset="0"/>
+              </a:rPr>
+              <a:t> </a:t>
+            </a:r>
+            <a:r>
+              <a:rPr lang="de-DE" sz="2400" b="1" dirty="0" err="1">
+                <a:latin typeface="Times New Roman" panose="02020603050405020304" pitchFamily="18" charset="0"/>
+                <a:cs typeface="Times New Roman" panose="02020603050405020304" pitchFamily="18" charset="0"/>
+              </a:rPr>
+              <a:t>language</a:t>
+            </a:r>
+            <a:r>
+              <a:rPr lang="de-DE" sz="2400" b="1" dirty="0">
+                <a:latin typeface="Times New Roman" panose="02020603050405020304" pitchFamily="18" charset="0"/>
+                <a:cs typeface="Times New Roman" panose="02020603050405020304" pitchFamily="18" charset="0"/>
+              </a:rPr>
+              <a:t> </a:t>
+            </a:r>
+            <a:r>
+              <a:rPr lang="de-DE" sz="2400" b="1" dirty="0" err="1">
+                <a:latin typeface="Times New Roman" panose="02020603050405020304" pitchFamily="18" charset="0"/>
+                <a:cs typeface="Times New Roman" panose="02020603050405020304" pitchFamily="18" charset="0"/>
+              </a:rPr>
+              <a:t>processing</a:t>
+            </a:r>
+            <a:r>
+              <a:rPr lang="de-DE" sz="2400" b="1" dirty="0">
+                <a:latin typeface="Times New Roman" panose="02020603050405020304" pitchFamily="18" charset="0"/>
+                <a:cs typeface="Times New Roman" panose="02020603050405020304" pitchFamily="18" charset="0"/>
+              </a:rPr>
+              <a:t> </a:t>
+            </a:r>
+            <a:r>
               <a:rPr lang="de-DE" sz="2400" dirty="0">
                 <a:latin typeface="Times New Roman" panose="02020603050405020304" pitchFamily="18" charset="0"/>
                 <a:cs typeface="Times New Roman" panose="02020603050405020304" pitchFamily="18" charset="0"/>
               </a:rPr>
-              <a:t> </a:t>
-            </a:r>
-            <a:r>
-              <a:rPr lang="de-DE" sz="2400" dirty="0" err="1">
-                <a:latin typeface="Times New Roman" panose="02020603050405020304" pitchFamily="18" charset="0"/>
-                <a:cs typeface="Times New Roman" panose="02020603050405020304" pitchFamily="18" charset="0"/>
-              </a:rPr>
-              <a:t>natural</a:t>
-            </a:r>
-            <a:r>
-              <a:rPr lang="de-DE" sz="2400" dirty="0">
-                <a:latin typeface="Times New Roman" panose="02020603050405020304" pitchFamily="18" charset="0"/>
-                <a:cs typeface="Times New Roman" panose="02020603050405020304" pitchFamily="18" charset="0"/>
-              </a:rPr>
-              <a:t> </a:t>
-            </a:r>
-            <a:r>
-              <a:rPr lang="de-DE" sz="2400" dirty="0" err="1">
-                <a:latin typeface="Times New Roman" panose="02020603050405020304" pitchFamily="18" charset="0"/>
-                <a:cs typeface="Times New Roman" panose="02020603050405020304" pitchFamily="18" charset="0"/>
-              </a:rPr>
-              <a:t>language</a:t>
-            </a:r>
-            <a:r>
-              <a:rPr lang="de-DE" sz="2400" dirty="0">
-                <a:latin typeface="Times New Roman" panose="02020603050405020304" pitchFamily="18" charset="0"/>
-                <a:cs typeface="Times New Roman" panose="02020603050405020304" pitchFamily="18" charset="0"/>
-              </a:rPr>
-              <a:t> </a:t>
-            </a:r>
-            <a:r>
-              <a:rPr lang="de-DE" sz="2400" dirty="0" err="1">
-                <a:latin typeface="Times New Roman" panose="02020603050405020304" pitchFamily="18" charset="0"/>
-                <a:cs typeface="Times New Roman" panose="02020603050405020304" pitchFamily="18" charset="0"/>
-              </a:rPr>
-              <a:t>processing</a:t>
-            </a:r>
-            <a:r>
-              <a:rPr lang="de-DE" sz="2400" dirty="0">
-                <a:latin typeface="Times New Roman" panose="02020603050405020304" pitchFamily="18" charset="0"/>
-                <a:cs typeface="Times New Roman" panose="02020603050405020304" pitchFamily="18" charset="0"/>
-              </a:rPr>
-              <a:t> (</a:t>
+              <a:t>(</a:t>
             </a:r>
             <a:r>
               <a:rPr lang="de-DE" sz="2400" dirty="0" err="1">
@@ -4671,7 +4537,7 @@
         </p:nvSpPr>
         <p:spPr>
           <a:xfrm>
-            <a:off x="497151" y="2689934"/>
+            <a:off x="461642" y="2228822"/>
             <a:ext cx="5646198" cy="461665"/>
           </a:xfrm>
           <a:prstGeom prst="rect">
@@ -4686,34 +4552,34 @@
           <a:lstStyle/>
           <a:p>
             <a:r>
-              <a:rPr lang="de-DE" sz="2400" dirty="0">
+              <a:rPr lang="de-DE" sz="2400" b="1" dirty="0">
                 <a:latin typeface="Times New Roman" panose="02020603050405020304" pitchFamily="18" charset="0"/>
                 <a:cs typeface="Times New Roman" panose="02020603050405020304" pitchFamily="18" charset="0"/>
               </a:rPr>
               <a:t>Content Base </a:t>
             </a:r>
             <a:r>
-              <a:rPr lang="de-DE" sz="2400" dirty="0" err="1">
+              <a:rPr lang="de-DE" sz="2400" b="1" dirty="0" err="1">
                 <a:latin typeface="Times New Roman" panose="02020603050405020304" pitchFamily="18" charset="0"/>
                 <a:cs typeface="Times New Roman" panose="02020603050405020304" pitchFamily="18" charset="0"/>
               </a:rPr>
               <a:t>recommender</a:t>
             </a:r>
             <a:r>
-              <a:rPr lang="de-DE" sz="2400" dirty="0">
+              <a:rPr lang="de-DE" sz="2400" b="1" dirty="0">
                 <a:latin typeface="Times New Roman" panose="02020603050405020304" pitchFamily="18" charset="0"/>
                 <a:cs typeface="Times New Roman" panose="02020603050405020304" pitchFamily="18" charset="0"/>
               </a:rPr>
               <a:t> </a:t>
             </a:r>
             <a:r>
-              <a:rPr lang="de-DE" sz="2400" dirty="0" err="1">
+              <a:rPr lang="de-DE" sz="2400" b="1" dirty="0" err="1">
                 <a:latin typeface="Times New Roman" panose="02020603050405020304" pitchFamily="18" charset="0"/>
                 <a:cs typeface="Times New Roman" panose="02020603050405020304" pitchFamily="18" charset="0"/>
               </a:rPr>
               <a:t>system</a:t>
             </a:r>
-            <a:endParaRPr lang="de-DE" sz="2400" dirty="0">
+            <a:endParaRPr lang="de-DE" sz="2400" b="1" dirty="0">
               <a:latin typeface="Times New Roman" panose="02020603050405020304" pitchFamily="18" charset="0"/>
               <a:cs typeface="Times New Roman" panose="02020603050405020304" pitchFamily="18" charset="0"/>
             </a:endParaRPr>
@@ -4734,7 +4600,7 @@
         </p:nvSpPr>
         <p:spPr>
           <a:xfrm>
-            <a:off x="1624614" y="3533313"/>
+            <a:off x="1553593" y="2965256"/>
             <a:ext cx="4471386" cy="369332"/>
           </a:xfrm>
           <a:prstGeom prst="rect">
@@ -4778,7 +4644,7 @@
         </p:nvSpPr>
         <p:spPr>
           <a:xfrm>
-            <a:off x="1624614" y="4099693"/>
+            <a:off x="1553593" y="3491598"/>
             <a:ext cx="4471386" cy="369332"/>
           </a:xfrm>
           <a:prstGeom prst="rect">
@@ -4818,7 +4684,7 @@
         </p:nvSpPr>
         <p:spPr>
           <a:xfrm>
-            <a:off x="1658647" y="4666073"/>
+            <a:off x="1553593" y="4059245"/>
             <a:ext cx="4471386" cy="369332"/>
           </a:xfrm>
           <a:prstGeom prst="rect">
@@ -4841,10 +4707,10 @@
       </p:sp>
       <p:pic>
         <p:nvPicPr>
-          <p:cNvPr id="12" name="Content Placeholder 11">
-            <a:extLst>
-              <a:ext uri="{FF2B5EF4-FFF2-40B4-BE49-F238E27FC236}">
-                <a16:creationId xmlns:a16="http://schemas.microsoft.com/office/drawing/2014/main" id="{50AC7108-296E-430F-B04D-DE89B8B1D4A2}"/>
+          <p:cNvPr id="6" name="Content Placeholder 5">
+            <a:extLst>
+              <a:ext uri="{FF2B5EF4-FFF2-40B4-BE49-F238E27FC236}">
+                <a16:creationId xmlns:a16="http://schemas.microsoft.com/office/drawing/2014/main" id="{44D37559-2D06-4298-9F8F-EA4C3A1BCA1E}"/>
               </a:ext>
             </a:extLst>
           </p:cNvPr>
@@ -4863,8 +4729,8 @@
         </p:blipFill>
         <p:spPr>
           <a:xfrm>
-            <a:off x="7554533" y="1690688"/>
-            <a:ext cx="4424401" cy="4351338"/>
+            <a:off x="310718" y="4719147"/>
+            <a:ext cx="11594237" cy="1773728"/>
           </a:xfrm>
         </p:spPr>
       </p:pic>

</xml_diff>